<commit_message>
Mise a jour UML
</commit_message>
<xml_diff>
--- a/UML/BileMo.pptx
+++ b/UML/BileMo.pptx
@@ -979,15 +979,7 @@
           <a:pPr rtl="0"/>
           <a:r>
             <a:rPr lang="fr-FR" b="0" i="0" dirty="0" smtClean="0"/>
-            <a:t>Exposez </a:t>
-          </a:r>
-          <a:r>
-            <a:rPr lang="fr-FR" b="0" i="0" dirty="0" smtClean="0"/>
-            <a:t>les </a:t>
-          </a:r>
-          <a:r>
-            <a:rPr lang="fr-FR" b="0" i="0" dirty="0" smtClean="0"/>
-            <a:t>données en suivant les règles des niveaux 1, 2 et 3 du modèle de Richardson</a:t>
+            <a:t>Exposez les données en suivant les règles des niveaux 1, 2 et 3 du modèle de Richardson</a:t>
           </a:r>
           <a:endParaRPr lang="fr-FR" noProof="0" dirty="0"/>
         </a:p>
@@ -1027,11 +1019,7 @@
           <a:pPr rtl="0"/>
           <a:r>
             <a:rPr lang="fr-FR" b="0" i="0" dirty="0" smtClean="0"/>
-            <a:t>Mises en cache des </a:t>
-          </a:r>
-          <a:r>
-            <a:rPr lang="fr-FR" b="0" i="0" dirty="0" smtClean="0"/>
-            <a:t>réponses</a:t>
+            <a:t>Mises en cache des réponses</a:t>
           </a:r>
           <a:endParaRPr lang="fr-FR" noProof="0" dirty="0"/>
         </a:p>
@@ -1397,15 +1385,7 @@
           </a:pPr>
           <a:r>
             <a:rPr lang="fr-FR" sz="2400" b="0" i="0" kern="1200" dirty="0" smtClean="0"/>
-            <a:t>Exposez </a:t>
-          </a:r>
-          <a:r>
-            <a:rPr lang="fr-FR" sz="2400" b="0" i="0" kern="1200" dirty="0" smtClean="0"/>
-            <a:t>les </a:t>
-          </a:r>
-          <a:r>
-            <a:rPr lang="fr-FR" sz="2400" b="0" i="0" kern="1200" dirty="0" smtClean="0"/>
-            <a:t>données en suivant les règles des niveaux 1, 2 et 3 du modèle de Richardson</a:t>
+            <a:t>Exposez les données en suivant les règles des niveaux 1, 2 et 3 du modèle de Richardson</a:t>
           </a:r>
           <a:endParaRPr lang="fr-FR" sz="2400" kern="1200" noProof="0" dirty="0"/>
         </a:p>
@@ -1514,11 +1494,7 @@
           </a:pPr>
           <a:r>
             <a:rPr lang="fr-FR" sz="2400" b="0" i="0" kern="1200" dirty="0" smtClean="0"/>
-            <a:t>Mises en cache des </a:t>
-          </a:r>
-          <a:r>
-            <a:rPr lang="fr-FR" sz="2400" b="0" i="0" kern="1200" dirty="0" smtClean="0"/>
-            <a:t>réponses</a:t>
+            <a:t>Mises en cache des réponses</a:t>
           </a:r>
           <a:endParaRPr lang="fr-FR" sz="2400" kern="1200" noProof="0" dirty="0"/>
         </a:p>
@@ -3152,7 +3128,7 @@
           <a:p>
             <a:fld id="{300E0152-FD71-476E-93B4-2748553546FC}" type="datetimeFigureOut">
               <a:rPr lang="fr-FR" smtClean="0"/>
-              <a:t>30/05/2022</a:t>
+              <a:t>03/06/2022</a:t>
             </a:fld>
             <a:endParaRPr lang="fr-FR"/>
           </a:p>
@@ -3330,7 +3306,7 @@
           <a:p>
             <a:fld id="{7E818C28-E326-4E30-9CF2-2C1A4C894E1E}" type="datetimeFigureOut">
               <a:rPr lang="fr-FR" noProof="0" smtClean="0"/>
-              <a:t>30/05/2022</a:t>
+              <a:t>03/06/2022</a:t>
             </a:fld>
             <a:endParaRPr lang="fr-FR" noProof="0"/>
           </a:p>
@@ -4543,7 +4519,7 @@
             <a:pPr rtl="0"/>
             <a:fld id="{84D57ED5-9CB3-4471-9B6F-968F3C8F84E1}" type="datetime1">
               <a:rPr lang="fr-FR" noProof="0" smtClean="0"/>
-              <a:t>30/05/2022</a:t>
+              <a:t>03/06/2022</a:t>
             </a:fld>
             <a:endParaRPr lang="fr-FR" noProof="0"/>
           </a:p>
@@ -4885,7 +4861,7 @@
             <a:pPr rtl="0"/>
             <a:fld id="{82C21BD6-09AD-4CE8-91E4-0CCB39C35B1C}" type="datetime1">
               <a:rPr lang="fr-FR" noProof="0" smtClean="0"/>
-              <a:t>30/05/2022</a:t>
+              <a:t>03/06/2022</a:t>
             </a:fld>
             <a:endParaRPr lang="fr-FR" noProof="0"/>
           </a:p>
@@ -5290,7 +5266,7 @@
             <a:pPr rtl="0"/>
             <a:fld id="{3C77B77F-91DD-4C26-904A-477D7569DB10}" type="datetime1">
               <a:rPr lang="fr-FR" noProof="0" smtClean="0"/>
-              <a:t>30/05/2022</a:t>
+              <a:t>03/06/2022</a:t>
             </a:fld>
             <a:endParaRPr lang="fr-FR" noProof="0"/>
           </a:p>
@@ -5630,7 +5606,7 @@
             <a:pPr rtl="0"/>
             <a:fld id="{BF2D40E6-123C-44C7-96E6-E5EB17E95AC5}" type="datetime1">
               <a:rPr lang="fr-FR" noProof="0" smtClean="0"/>
-              <a:t>30/05/2022</a:t>
+              <a:t>03/06/2022</a:t>
             </a:fld>
             <a:endParaRPr lang="fr-FR" noProof="0"/>
           </a:p>
@@ -5955,7 +5931,7 @@
             <a:pPr rtl="0"/>
             <a:fld id="{BF2D40E6-123C-44C7-96E6-E5EB17E95AC5}" type="datetime1">
               <a:rPr lang="fr-FR" noProof="0" smtClean="0"/>
-              <a:t>30/05/2022</a:t>
+              <a:t>03/06/2022</a:t>
             </a:fld>
             <a:endParaRPr lang="fr-FR" noProof="0"/>
           </a:p>
@@ -6356,7 +6332,7 @@
             <a:pPr rtl="0"/>
             <a:fld id="{5E9C6408-3BC8-40DF-BC19-0E01079E3CE3}" type="datetime1">
               <a:rPr lang="fr-FR" noProof="0" smtClean="0"/>
-              <a:t>30/05/2022</a:t>
+              <a:t>03/06/2022</a:t>
             </a:fld>
             <a:endParaRPr lang="fr-FR" noProof="0"/>
           </a:p>
@@ -6617,7 +6593,7 @@
             <a:pPr rtl="0"/>
             <a:fld id="{475489E5-EE2A-4D3B-B34D-823A7028B4FB}" type="datetime1">
               <a:rPr lang="fr-FR" noProof="0" smtClean="0"/>
-              <a:t>30/05/2022</a:t>
+              <a:t>03/06/2022</a:t>
             </a:fld>
             <a:endParaRPr lang="fr-FR" noProof="0"/>
           </a:p>
@@ -6883,7 +6859,7 @@
             <a:pPr rtl="0"/>
             <a:fld id="{CD123ACB-C9EE-4C9E-B8CE-AAAC5E9A0232}" type="datetime1">
               <a:rPr lang="fr-FR" noProof="0" smtClean="0"/>
-              <a:t>30/05/2022</a:t>
+              <a:t>03/06/2022</a:t>
             </a:fld>
             <a:endParaRPr lang="fr-FR" noProof="0"/>
           </a:p>
@@ -7149,7 +7125,7 @@
             <a:pPr rtl="0"/>
             <a:fld id="{6860E4D8-56D9-4E46-AB44-CADDEB05CB81}" type="datetime1">
               <a:rPr lang="fr-FR" noProof="0" smtClean="0"/>
-              <a:t>30/05/2022</a:t>
+              <a:t>03/06/2022</a:t>
             </a:fld>
             <a:endParaRPr lang="fr-FR" noProof="0"/>
           </a:p>
@@ -7482,7 +7458,7 @@
             <a:pPr rtl="0"/>
             <a:fld id="{BF2D40E6-123C-44C7-96E6-E5EB17E95AC5}" type="datetime1">
               <a:rPr lang="fr-FR" noProof="0" smtClean="0"/>
-              <a:t>30/05/2022</a:t>
+              <a:t>03/06/2022</a:t>
             </a:fld>
             <a:endParaRPr lang="fr-FR" noProof="0"/>
           </a:p>
@@ -7810,7 +7786,7 @@
             <a:pPr rtl="0"/>
             <a:fld id="{5ADDB20C-1774-4B16-9666-0BE66B3E81AC}" type="datetime1">
               <a:rPr lang="fr-FR" noProof="0" smtClean="0"/>
-              <a:t>30/05/2022</a:t>
+              <a:t>03/06/2022</a:t>
             </a:fld>
             <a:endParaRPr lang="fr-FR" noProof="0"/>
           </a:p>
@@ -8271,7 +8247,7 @@
             <a:pPr rtl="0"/>
             <a:fld id="{1F37DF42-8FE2-4196-B087-A644399BE082}" type="datetime1">
               <a:rPr lang="fr-FR" noProof="0" smtClean="0"/>
-              <a:t>30/05/2022</a:t>
+              <a:t>03/06/2022</a:t>
             </a:fld>
             <a:endParaRPr lang="fr-FR" noProof="0"/>
           </a:p>
@@ -8480,7 +8456,7 @@
             <a:pPr rtl="0"/>
             <a:fld id="{BF2D40E6-123C-44C7-96E6-E5EB17E95AC5}" type="datetime1">
               <a:rPr lang="fr-FR" noProof="0" smtClean="0"/>
-              <a:t>30/05/2022</a:t>
+              <a:t>03/06/2022</a:t>
             </a:fld>
             <a:endParaRPr lang="fr-FR" noProof="0"/>
           </a:p>
@@ -8662,7 +8638,7 @@
             <a:pPr rtl="0"/>
             <a:fld id="{A9AA5441-00F0-4727-A8C3-46A783FC5724}" type="datetime1">
               <a:rPr lang="fr-FR" noProof="0" smtClean="0"/>
-              <a:t>30/05/2022</a:t>
+              <a:t>03/06/2022</a:t>
             </a:fld>
             <a:endParaRPr lang="fr-FR" noProof="0"/>
           </a:p>
@@ -8999,7 +8975,7 @@
             <a:pPr rtl="0"/>
             <a:fld id="{C032274E-A475-49B8-A4A0-80F13BCA3C3A}" type="datetime1">
               <a:rPr lang="fr-FR" noProof="0" smtClean="0"/>
-              <a:t>30/05/2022</a:t>
+              <a:t>03/06/2022</a:t>
             </a:fld>
             <a:endParaRPr lang="fr-FR" noProof="0"/>
           </a:p>
@@ -9348,7 +9324,7 @@
             <a:pPr rtl="0"/>
             <a:fld id="{F9CED46A-8872-470A-807E-03961E183B93}" type="datetime1">
               <a:rPr lang="fr-FR" noProof="0" smtClean="0"/>
-              <a:t>30/05/2022</a:t>
+              <a:t>03/06/2022</a:t>
             </a:fld>
             <a:endParaRPr lang="fr-FR" noProof="0"/>
           </a:p>
@@ -11406,7 +11382,7 @@
             <a:pPr rtl="0"/>
             <a:fld id="{BF2D40E6-123C-44C7-96E6-E5EB17E95AC5}" type="datetime1">
               <a:rPr lang="fr-FR" noProof="0" smtClean="0"/>
-              <a:t>30/05/2022</a:t>
+              <a:t>03/06/2022</a:t>
             </a:fld>
             <a:endParaRPr lang="fr-FR" noProof="0"/>
           </a:p>
@@ -12366,7 +12342,7 @@
         <p:spPr>
           <a:xfrm>
             <a:off x="274388" y="1429789"/>
-            <a:ext cx="11820630" cy="5216172"/>
+            <a:ext cx="11820630" cy="4919745"/>
           </a:xfrm>
           <a:prstGeom prst="rect">
             <a:avLst/>
@@ -12380,329 +12356,296 @@
           <a:p>
             <a:pPr>
               <a:lnSpc>
-                <a:spcPct val="150000"/>
+                <a:spcPct val="200000"/>
               </a:lnSpc>
             </a:pPr>
             <a:r>
-              <a:rPr lang="fr-FR" sz="1600" b="1" dirty="0" smtClean="0"/>
+              <a:rPr lang="fr-FR" sz="2000" b="1" dirty="0" smtClean="0"/>
               <a:t>Doctrine: </a:t>
             </a:r>
             <a:r>
-              <a:rPr lang="fr-FR" sz="1600" dirty="0" smtClean="0"/>
+              <a:rPr lang="fr-FR" sz="2000" dirty="0" smtClean="0"/>
               <a:t>ORM de </a:t>
             </a:r>
             <a:r>
-              <a:rPr lang="fr-FR" sz="1600" dirty="0" err="1" smtClean="0"/>
+              <a:rPr lang="fr-FR" sz="2000" dirty="0" err="1" smtClean="0"/>
               <a:t>symfony</a:t>
             </a:r>
-            <a:endParaRPr lang="fr-FR" sz="1600" dirty="0"/>
+            <a:endParaRPr lang="fr-FR" sz="2000" dirty="0"/>
           </a:p>
           <a:p>
             <a:pPr>
               <a:lnSpc>
-                <a:spcPct val="150000"/>
+                <a:spcPct val="200000"/>
               </a:lnSpc>
             </a:pPr>
-            <a:endParaRPr lang="fr-FR" sz="1600" dirty="0"/>
+            <a:r>
+              <a:rPr lang="fr-FR" sz="2000" b="1" dirty="0" err="1" smtClean="0"/>
+              <a:t>Faker</a:t>
+            </a:r>
+            <a:r>
+              <a:rPr lang="fr-FR" sz="2000" dirty="0" smtClean="0"/>
+              <a:t> </a:t>
+            </a:r>
+            <a:r>
+              <a:rPr lang="fr-FR" sz="2000" dirty="0"/>
+              <a:t>: </a:t>
+            </a:r>
+            <a:r>
+              <a:rPr lang="fr-FR" sz="2000" dirty="0" smtClean="0"/>
+              <a:t>Création des </a:t>
+            </a:r>
+            <a:r>
+              <a:rPr lang="fr-FR" sz="2000" dirty="0" err="1" smtClean="0"/>
+              <a:t>Fixtures</a:t>
+            </a:r>
+            <a:r>
+              <a:rPr lang="fr-FR" sz="2000" dirty="0" smtClean="0"/>
+              <a:t> avec fausses données</a:t>
+            </a:r>
+            <a:endParaRPr lang="fr-FR" sz="2000" dirty="0"/>
           </a:p>
           <a:p>
             <a:pPr>
               <a:lnSpc>
-                <a:spcPct val="150000"/>
+                <a:spcPct val="200000"/>
               </a:lnSpc>
             </a:pPr>
             <a:r>
-              <a:rPr lang="fr-FR" sz="1600" b="1" dirty="0" err="1" smtClean="0"/>
-              <a:t>Faker</a:t>
-            </a:r>
-            <a:r>
-              <a:rPr lang="fr-FR" sz="1600" dirty="0" smtClean="0"/>
-              <a:t> </a:t>
-            </a:r>
-            <a:r>
-              <a:rPr lang="fr-FR" sz="1600" dirty="0"/>
+              <a:rPr lang="fr-FR" sz="2000" b="1" dirty="0" smtClean="0"/>
+              <a:t>JMS </a:t>
+            </a:r>
+            <a:r>
+              <a:rPr lang="fr-FR" sz="2000" b="1" dirty="0" smtClean="0"/>
               <a:t>: </a:t>
             </a:r>
             <a:r>
-              <a:rPr lang="fr-FR" sz="1600" dirty="0" smtClean="0"/>
-              <a:t>Création des </a:t>
-            </a:r>
-            <a:r>
-              <a:rPr lang="fr-FR" sz="1600" dirty="0" err="1" smtClean="0"/>
-              <a:t>Fixtures</a:t>
-            </a:r>
-            <a:r>
-              <a:rPr lang="fr-FR" sz="1600" dirty="0" smtClean="0"/>
-              <a:t> avec fausses données</a:t>
-            </a:r>
-            <a:endParaRPr lang="fr-FR" sz="1600" dirty="0"/>
+              <a:rPr lang="fr-FR" sz="2000" dirty="0" smtClean="0"/>
+              <a:t>Cette </a:t>
+            </a:r>
+            <a:r>
+              <a:rPr lang="fr-FR" sz="2000" dirty="0"/>
+              <a:t>bibliothèque </a:t>
+            </a:r>
+            <a:r>
+              <a:rPr lang="fr-FR" sz="2000" dirty="0" smtClean="0"/>
+              <a:t>permet </a:t>
+            </a:r>
+            <a:r>
+              <a:rPr lang="fr-FR" sz="2000" dirty="0"/>
+              <a:t>de </a:t>
+            </a:r>
+            <a:r>
+              <a:rPr lang="fr-FR" sz="2000" dirty="0" smtClean="0"/>
+              <a:t>sérialiser </a:t>
+            </a:r>
+            <a:r>
+              <a:rPr lang="fr-FR" sz="2000" dirty="0"/>
+              <a:t>des </a:t>
+            </a:r>
+            <a:r>
+              <a:rPr lang="fr-FR" sz="2000" dirty="0" smtClean="0"/>
+              <a:t>données</a:t>
+            </a:r>
           </a:p>
           <a:p>
             <a:pPr>
               <a:lnSpc>
-                <a:spcPct val="150000"/>
+                <a:spcPct val="200000"/>
               </a:lnSpc>
             </a:pPr>
-            <a:endParaRPr lang="fr-FR" sz="1600" dirty="0"/>
+            <a:r>
+              <a:rPr lang="fr-FR" sz="2000" b="1" dirty="0" err="1" smtClean="0"/>
+              <a:t>Lexit</a:t>
+            </a:r>
+            <a:r>
+              <a:rPr lang="fr-FR" sz="2000" b="1" dirty="0" smtClean="0"/>
+              <a:t>/</a:t>
+            </a:r>
+            <a:r>
+              <a:rPr lang="fr-FR" sz="2000" b="1" dirty="0" err="1" smtClean="0"/>
+              <a:t>jwt-authentication</a:t>
+            </a:r>
+            <a:r>
+              <a:rPr lang="fr-FR" sz="2000" dirty="0" smtClean="0"/>
+              <a:t> </a:t>
+            </a:r>
+            <a:r>
+              <a:rPr lang="fr-FR" sz="2000" dirty="0" smtClean="0"/>
+              <a:t>: Pour l’</a:t>
+            </a:r>
+            <a:r>
+              <a:rPr lang="fr-FR" sz="2000" dirty="0" err="1" smtClean="0"/>
+              <a:t>authantification</a:t>
+            </a:r>
+            <a:r>
+              <a:rPr lang="fr-FR" sz="2000" dirty="0" smtClean="0"/>
+              <a:t> via un TOKEN JSON</a:t>
+            </a:r>
+            <a:endParaRPr lang="fr-FR" sz="2000" dirty="0"/>
           </a:p>
           <a:p>
             <a:pPr>
               <a:lnSpc>
-                <a:spcPct val="150000"/>
+                <a:spcPct val="200000"/>
               </a:lnSpc>
             </a:pPr>
             <a:r>
-              <a:rPr lang="fr-FR" sz="1600" b="1" dirty="0" smtClean="0"/>
-              <a:t>JMS </a:t>
-            </a:r>
-            <a:r>
-              <a:rPr lang="fr-FR" sz="1600" b="1" dirty="0" smtClean="0"/>
+              <a:rPr lang="fr-FR" sz="2000" b="1" dirty="0" err="1" smtClean="0"/>
+              <a:t>PagerFanta</a:t>
+            </a:r>
+            <a:r>
+              <a:rPr lang="fr-FR" sz="2000" dirty="0" smtClean="0"/>
+              <a:t> </a:t>
+            </a:r>
+            <a:r>
+              <a:rPr lang="fr-FR" sz="2000" dirty="0"/>
               <a:t>: </a:t>
             </a:r>
             <a:r>
-              <a:rPr lang="fr-FR" sz="1600" dirty="0" smtClean="0"/>
-              <a:t>Cette </a:t>
-            </a:r>
-            <a:r>
-              <a:rPr lang="fr-FR" sz="1600" dirty="0"/>
-              <a:t>bibliothèque vous permet de (dé-)sérialiser des données de toute complexité</a:t>
-            </a:r>
-            <a:endParaRPr lang="fr-FR" sz="1600" dirty="0"/>
+              <a:rPr lang="fr-FR" sz="2000" dirty="0" smtClean="0"/>
+              <a:t>Permet la pagination</a:t>
+            </a:r>
+            <a:endParaRPr lang="fr-FR" sz="2000" dirty="0"/>
           </a:p>
           <a:p>
             <a:pPr>
               <a:lnSpc>
-                <a:spcPct val="150000"/>
+                <a:spcPct val="200000"/>
               </a:lnSpc>
             </a:pPr>
-            <a:endParaRPr lang="fr-FR" sz="1600" dirty="0"/>
+            <a:r>
+              <a:rPr lang="fr-FR" sz="2000" b="1" dirty="0" err="1" smtClean="0"/>
+              <a:t>psr</a:t>
+            </a:r>
+            <a:r>
+              <a:rPr lang="fr-FR" sz="2000" b="1" dirty="0" smtClean="0"/>
+              <a:t>/cache</a:t>
+            </a:r>
+            <a:r>
+              <a:rPr lang="fr-FR" sz="2000" dirty="0" smtClean="0"/>
+              <a:t> </a:t>
+            </a:r>
+            <a:r>
+              <a:rPr lang="fr-FR" sz="2000" dirty="0"/>
+              <a:t>: </a:t>
+            </a:r>
+            <a:r>
+              <a:rPr lang="fr-FR" sz="2000" dirty="0" smtClean="0"/>
+              <a:t>Gestion du cache</a:t>
+            </a:r>
           </a:p>
           <a:p>
             <a:pPr>
               <a:lnSpc>
-                <a:spcPct val="150000"/>
+                <a:spcPct val="200000"/>
               </a:lnSpc>
             </a:pPr>
             <a:r>
-              <a:rPr lang="fr-FR" sz="1600" b="1" dirty="0" err="1" smtClean="0"/>
-              <a:t>Lexit</a:t>
-            </a:r>
-            <a:r>
-              <a:rPr lang="fr-FR" sz="1600" b="1" dirty="0" smtClean="0"/>
+              <a:rPr lang="fr-FR" sz="2000" b="1" dirty="0" err="1" smtClean="0"/>
+              <a:t>willdurand</a:t>
+            </a:r>
+            <a:r>
+              <a:rPr lang="fr-FR" sz="2000" b="1" dirty="0" smtClean="0"/>
               <a:t>/</a:t>
             </a:r>
             <a:r>
-              <a:rPr lang="fr-FR" sz="1600" b="1" dirty="0" err="1" smtClean="0"/>
-              <a:t>jwt-authentication</a:t>
-            </a:r>
-            <a:r>
-              <a:rPr lang="fr-FR" sz="1600" dirty="0" smtClean="0"/>
-              <a:t> : Pour l’</a:t>
-            </a:r>
-            <a:r>
-              <a:rPr lang="fr-FR" sz="1600" dirty="0" err="1" smtClean="0"/>
-              <a:t>authantification</a:t>
-            </a:r>
-            <a:r>
-              <a:rPr lang="fr-FR" sz="1600" dirty="0" smtClean="0"/>
-              <a:t> via un TOKEN JSON</a:t>
-            </a:r>
-            <a:endParaRPr lang="fr-FR" sz="1600" dirty="0"/>
-          </a:p>
-          <a:p>
-            <a:pPr>
-              <a:lnSpc>
-                <a:spcPct val="150000"/>
-              </a:lnSpc>
-            </a:pPr>
-            <a:endParaRPr lang="fr-FR" sz="1600" dirty="0"/>
-          </a:p>
-          <a:p>
-            <a:pPr>
-              <a:lnSpc>
-                <a:spcPct val="150000"/>
-              </a:lnSpc>
-            </a:pPr>
-            <a:r>
-              <a:rPr lang="fr-FR" sz="1600" b="1" dirty="0" err="1" smtClean="0"/>
-              <a:t>PagerFanta</a:t>
-            </a:r>
-            <a:r>
-              <a:rPr lang="fr-FR" sz="1600" dirty="0" smtClean="0"/>
+              <a:rPr lang="fr-FR" sz="2000" b="1" dirty="0" err="1" smtClean="0"/>
+              <a:t>hateoas</a:t>
+            </a:r>
+            <a:r>
+              <a:rPr lang="fr-FR" sz="2000" b="1" dirty="0" smtClean="0"/>
               <a:t> </a:t>
             </a:r>
             <a:r>
-              <a:rPr lang="fr-FR" sz="1600" dirty="0"/>
+              <a:rPr lang="fr-FR" sz="2000" b="1" dirty="0"/>
               <a:t>: </a:t>
             </a:r>
             <a:r>
-              <a:rPr lang="fr-FR" sz="1600" dirty="0" smtClean="0"/>
-              <a:t>Permet la pagination</a:t>
-            </a:r>
-            <a:endParaRPr lang="fr-FR" sz="1600" dirty="0"/>
-          </a:p>
-          <a:p>
-            <a:pPr>
-              <a:lnSpc>
-                <a:spcPct val="150000"/>
-              </a:lnSpc>
-            </a:pPr>
-            <a:endParaRPr lang="fr-FR" sz="1600" dirty="0"/>
-          </a:p>
-          <a:p>
-            <a:pPr>
-              <a:lnSpc>
-                <a:spcPct val="150000"/>
-              </a:lnSpc>
-            </a:pPr>
-            <a:r>
-              <a:rPr lang="fr-FR" sz="1600" b="1" dirty="0" err="1"/>
-              <a:t>psr</a:t>
-            </a:r>
-            <a:r>
-              <a:rPr lang="fr-FR" sz="1600" b="1" dirty="0"/>
-              <a:t>/cache</a:t>
-            </a:r>
-            <a:r>
-              <a:rPr lang="fr-FR" sz="1600" dirty="0" smtClean="0"/>
+              <a:rPr lang="en-US" sz="2000" b="1" dirty="0"/>
+              <a:t>H</a:t>
+            </a:r>
+            <a:r>
+              <a:rPr lang="en-US" sz="2000" dirty="0"/>
+              <a:t>ypermedia </a:t>
+            </a:r>
+            <a:r>
+              <a:rPr lang="en-US" sz="2000" b="1" dirty="0"/>
+              <a:t>A</a:t>
+            </a:r>
+            <a:r>
+              <a:rPr lang="en-US" sz="2000" dirty="0"/>
+              <a:t>s </a:t>
+            </a:r>
+            <a:r>
+              <a:rPr lang="en-US" sz="2000" b="1" dirty="0"/>
+              <a:t>T</a:t>
+            </a:r>
+            <a:r>
+              <a:rPr lang="en-US" sz="2000" dirty="0"/>
+              <a:t>he </a:t>
+            </a:r>
+            <a:r>
+              <a:rPr lang="en-US" sz="2000" b="1" dirty="0"/>
+              <a:t>E</a:t>
+            </a:r>
+            <a:r>
+              <a:rPr lang="en-US" sz="2000" dirty="0"/>
+              <a:t>ngine </a:t>
+            </a:r>
+            <a:r>
+              <a:rPr lang="en-US" sz="2000" b="1" dirty="0"/>
+              <a:t>O</a:t>
+            </a:r>
+            <a:r>
+              <a:rPr lang="en-US" sz="2000" dirty="0"/>
+              <a:t>f </a:t>
+            </a:r>
+            <a:r>
+              <a:rPr lang="en-US" sz="2000" b="1" dirty="0"/>
+              <a:t>A</a:t>
+            </a:r>
+            <a:r>
+              <a:rPr lang="en-US" sz="2000" dirty="0"/>
+              <a:t>pplication </a:t>
+            </a:r>
+            <a:r>
+              <a:rPr lang="en-US" sz="2000" b="1" dirty="0" smtClean="0"/>
+              <a:t>S</a:t>
+            </a:r>
+            <a:r>
+              <a:rPr lang="en-US" sz="2000" dirty="0" smtClean="0"/>
+              <a:t>tate, </a:t>
+            </a:r>
+            <a:r>
+              <a:rPr lang="en-US" sz="2000" dirty="0" err="1" smtClean="0"/>
+              <a:t>permet</a:t>
+            </a:r>
+            <a:r>
+              <a:rPr lang="en-US" sz="2000" dirty="0" smtClean="0"/>
+              <a:t> de </a:t>
+            </a:r>
+            <a:r>
+              <a:rPr lang="en-US" sz="2000" dirty="0" err="1" smtClean="0"/>
+              <a:t>rendre</a:t>
+            </a:r>
+            <a:r>
+              <a:rPr lang="en-US" sz="2000" dirty="0" smtClean="0"/>
               <a:t> </a:t>
             </a:r>
             <a:r>
-              <a:rPr lang="fr-FR" sz="1600" dirty="0"/>
-              <a:t>: </a:t>
-            </a:r>
-            <a:r>
-              <a:rPr lang="fr-FR" sz="1600" dirty="0" smtClean="0"/>
-              <a:t>Gestion </a:t>
-            </a:r>
-            <a:r>
-              <a:rPr lang="fr-FR" sz="1600" dirty="0" smtClean="0"/>
-              <a:t>du </a:t>
-            </a:r>
-            <a:r>
-              <a:rPr lang="fr-FR" sz="1600" dirty="0" smtClean="0"/>
-              <a:t>cache</a:t>
-            </a:r>
-          </a:p>
-          <a:p>
-            <a:pPr>
-              <a:lnSpc>
-                <a:spcPct val="150000"/>
-              </a:lnSpc>
-            </a:pPr>
-            <a:endParaRPr lang="fr-FR" sz="1600" dirty="0" smtClean="0"/>
-          </a:p>
-          <a:p>
-            <a:pPr>
-              <a:lnSpc>
-                <a:spcPct val="150000"/>
-              </a:lnSpc>
-            </a:pPr>
-            <a:r>
-              <a:rPr lang="fr-FR" sz="1600" b="1" dirty="0" err="1"/>
-              <a:t>willdurand</a:t>
-            </a:r>
-            <a:r>
-              <a:rPr lang="fr-FR" sz="1600" b="1" dirty="0"/>
-              <a:t>/</a:t>
-            </a:r>
-            <a:r>
-              <a:rPr lang="fr-FR" sz="1600" b="1" dirty="0" err="1"/>
-              <a:t>hateoas</a:t>
-            </a:r>
-            <a:r>
-              <a:rPr lang="fr-FR" sz="1600" b="1" dirty="0"/>
-              <a:t> : </a:t>
-            </a:r>
-            <a:r>
-              <a:rPr lang="en-US" sz="1600" b="1" dirty="0"/>
-              <a:t>H</a:t>
-            </a:r>
-            <a:r>
-              <a:rPr lang="en-US" sz="1600" dirty="0"/>
-              <a:t>ypermedia </a:t>
-            </a:r>
-            <a:r>
-              <a:rPr lang="en-US" sz="1600" b="1" dirty="0"/>
-              <a:t>A</a:t>
-            </a:r>
-            <a:r>
-              <a:rPr lang="en-US" sz="1600" dirty="0"/>
-              <a:t>s </a:t>
-            </a:r>
-            <a:r>
-              <a:rPr lang="en-US" sz="1600" b="1" dirty="0"/>
-              <a:t>T</a:t>
-            </a:r>
-            <a:r>
-              <a:rPr lang="en-US" sz="1600" dirty="0"/>
-              <a:t>he </a:t>
-            </a:r>
-            <a:r>
-              <a:rPr lang="en-US" sz="1600" b="1" dirty="0"/>
-              <a:t>E</a:t>
-            </a:r>
-            <a:r>
-              <a:rPr lang="en-US" sz="1600" dirty="0"/>
-              <a:t>ngine </a:t>
-            </a:r>
-            <a:r>
-              <a:rPr lang="en-US" sz="1600" b="1" dirty="0"/>
-              <a:t>O</a:t>
-            </a:r>
-            <a:r>
-              <a:rPr lang="en-US" sz="1600" dirty="0"/>
-              <a:t>f </a:t>
-            </a:r>
-            <a:r>
-              <a:rPr lang="en-US" sz="1600" b="1" dirty="0"/>
-              <a:t>A</a:t>
-            </a:r>
-            <a:r>
-              <a:rPr lang="en-US" sz="1600" dirty="0"/>
-              <a:t>pplication </a:t>
-            </a:r>
-            <a:r>
-              <a:rPr lang="en-US" sz="1600" b="1" dirty="0" smtClean="0"/>
-              <a:t>S</a:t>
-            </a:r>
-            <a:r>
-              <a:rPr lang="en-US" sz="1600" dirty="0" smtClean="0"/>
-              <a:t>tate, </a:t>
-            </a:r>
-            <a:r>
-              <a:rPr lang="en-US" sz="1600" dirty="0" err="1" smtClean="0"/>
-              <a:t>permet</a:t>
-            </a:r>
-            <a:r>
-              <a:rPr lang="en-US" sz="1600" dirty="0" smtClean="0"/>
-              <a:t> de </a:t>
-            </a:r>
-            <a:r>
-              <a:rPr lang="en-US" sz="1600" dirty="0" err="1" smtClean="0"/>
-              <a:t>rendre</a:t>
-            </a:r>
-            <a:r>
-              <a:rPr lang="en-US" sz="1600" dirty="0" smtClean="0"/>
-              <a:t> </a:t>
-            </a:r>
-            <a:r>
-              <a:rPr lang="en-US" sz="1600" dirty="0" err="1" smtClean="0"/>
+              <a:rPr lang="en-US" sz="2000" dirty="0" err="1" smtClean="0"/>
               <a:t>l’API</a:t>
             </a:r>
             <a:r>
-              <a:rPr lang="en-US" sz="1600" dirty="0" smtClean="0"/>
+              <a:rPr lang="en-US" sz="2000" dirty="0" smtClean="0"/>
               <a:t> auto </a:t>
             </a:r>
             <a:r>
-              <a:rPr lang="en-US" sz="1600" dirty="0" err="1" smtClean="0"/>
+              <a:rPr lang="en-US" sz="2000" dirty="0" err="1" smtClean="0"/>
               <a:t>découvrable</a:t>
             </a:r>
-            <a:r>
-              <a:rPr lang="en-US" sz="1600" dirty="0" smtClean="0"/>
-              <a:t> et navigable.</a:t>
-            </a:r>
-            <a:endParaRPr lang="fr-FR" sz="1600" dirty="0"/>
+            <a:endParaRPr lang="fr-FR" sz="2000" dirty="0"/>
           </a:p>
         </p:txBody>
       </p:sp>
@@ -13511,7 +13454,7 @@
         <p:spPr>
           <a:xfrm>
             <a:off x="5922819" y="1994714"/>
-            <a:ext cx="6096000" cy="3323987"/>
+            <a:ext cx="6096000" cy="2862322"/>
           </a:xfrm>
           <a:prstGeom prst="rect">
             <a:avLst/>
@@ -13534,19 +13477,13 @@
               <a:rPr lang="fr-FR" sz="2000" dirty="0" smtClean="0">
                 <a:latin typeface="arial" panose="020B0604020202020204" pitchFamily="34" charset="0"/>
               </a:rPr>
-              <a:t> </a:t>
-            </a:r>
-            <a:r>
-              <a:rPr lang="fr-FR" sz="2000" dirty="0" smtClean="0">
-                <a:latin typeface="arial" panose="020B0604020202020204" pitchFamily="34" charset="0"/>
-              </a:rPr>
-              <a:t>20x </a:t>
+              <a:t> 20x </a:t>
             </a:r>
             <a:r>
               <a:rPr lang="fr-FR" sz="2000" dirty="0">
                 <a:latin typeface="arial" panose="020B0604020202020204" pitchFamily="34" charset="0"/>
               </a:rPr>
-              <a:t>: succès de la requête ;</a:t>
+              <a:t>: succès de la requête </a:t>
             </a:r>
           </a:p>
           <a:p>
@@ -13561,20 +13498,23 @@
               <a:rPr lang="fr-FR" sz="2000" dirty="0" smtClean="0">
                 <a:latin typeface="arial" panose="020B0604020202020204" pitchFamily="34" charset="0"/>
               </a:rPr>
-              <a:t> </a:t>
+              <a:t> 30x </a:t>
+            </a:r>
+            <a:r>
+              <a:rPr lang="fr-FR" sz="2000" dirty="0">
+                <a:latin typeface="arial" panose="020B0604020202020204" pitchFamily="34" charset="0"/>
+              </a:rPr>
+              <a:t>: </a:t>
             </a:r>
             <a:r>
               <a:rPr lang="fr-FR" sz="2000" dirty="0" smtClean="0">
                 <a:latin typeface="arial" panose="020B0604020202020204" pitchFamily="34" charset="0"/>
               </a:rPr>
-              <a:t>30x </a:t>
-            </a:r>
-            <a:r>
-              <a:rPr lang="fr-FR" sz="2000" dirty="0">
-                <a:latin typeface="arial" panose="020B0604020202020204" pitchFamily="34" charset="0"/>
-              </a:rPr>
-              <a:t>: redirection, respectivement permanente et temporaire ;</a:t>
-            </a:r>
+              <a:t>redirection</a:t>
+            </a:r>
+            <a:endParaRPr lang="fr-FR" sz="2000" dirty="0">
+              <a:latin typeface="arial" panose="020B0604020202020204" pitchFamily="34" charset="0"/>
+            </a:endParaRPr>
           </a:p>
           <a:p>
             <a:pPr>
@@ -13594,7 +13534,7 @@
               <a:rPr lang="fr-FR" sz="2000" dirty="0">
                 <a:latin typeface="arial" panose="020B0604020202020204" pitchFamily="34" charset="0"/>
               </a:rPr>
-              <a:t>: utilisateur non authentifié ;</a:t>
+              <a:t>: utilisateur non authentifié </a:t>
             </a:r>
           </a:p>
           <a:p>
@@ -13615,7 +13555,7 @@
               <a:rPr lang="fr-FR" sz="2000" dirty="0">
                 <a:latin typeface="arial" panose="020B0604020202020204" pitchFamily="34" charset="0"/>
               </a:rPr>
-              <a:t>: accès refusé ;</a:t>
+              <a:t>: accès refusé </a:t>
             </a:r>
           </a:p>
           <a:p>
@@ -13636,7 +13576,7 @@
               <a:rPr lang="fr-FR" sz="2000" dirty="0">
                 <a:latin typeface="arial" panose="020B0604020202020204" pitchFamily="34" charset="0"/>
               </a:rPr>
-              <a:t>: ressource non trouvée ;</a:t>
+              <a:t>: ressource non trouvée </a:t>
             </a:r>
           </a:p>
           <a:p>
@@ -13651,13 +13591,7 @@
               <a:rPr lang="fr-FR" sz="2000" dirty="0" smtClean="0">
                 <a:latin typeface="arial" panose="020B0604020202020204" pitchFamily="34" charset="0"/>
               </a:rPr>
-              <a:t> </a:t>
-            </a:r>
-            <a:r>
-              <a:rPr lang="fr-FR" sz="2000" dirty="0" smtClean="0">
-                <a:latin typeface="arial" panose="020B0604020202020204" pitchFamily="34" charset="0"/>
-              </a:rPr>
-              <a:t>50X: </a:t>
+              <a:t> 50X: </a:t>
             </a:r>
             <a:r>
               <a:rPr lang="fr-FR" sz="2000" dirty="0">
@@ -13665,15 +13599,6 @@
               </a:rPr>
               <a:t>erreurs serveur </a:t>
             </a:r>
-            <a:r>
-              <a:rPr lang="fr-FR" sz="2000" dirty="0" smtClean="0">
-                <a:latin typeface="arial" panose="020B0604020202020204" pitchFamily="34" charset="0"/>
-              </a:rPr>
-              <a:t>;</a:t>
-            </a:r>
-            <a:endParaRPr lang="fr-FR" sz="2000" dirty="0">
-              <a:latin typeface="arial" panose="020B0604020202020204" pitchFamily="34" charset="0"/>
-            </a:endParaRPr>
           </a:p>
         </p:txBody>
       </p:sp>
@@ -13918,32 +13843,13 @@
             </a:r>
             <a:r>
               <a:rPr lang="fr-FR" dirty="0"/>
-              <a:t> (/</a:t>
-            </a:r>
-            <a:r>
-              <a:rPr lang="fr-FR" dirty="0" err="1"/>
-              <a:t>users</a:t>
-            </a:r>
-            <a:r>
-              <a:rPr lang="fr-FR" dirty="0"/>
-              <a:t>/</a:t>
-            </a:r>
-            <a:r>
-              <a:rPr lang="fr-FR" dirty="0" err="1"/>
-              <a:t>posts</a:t>
-            </a:r>
-            <a:r>
-              <a:rPr lang="fr-FR" dirty="0"/>
-              <a:t>/1/</a:t>
-            </a:r>
-            <a:r>
-              <a:rPr lang="fr-FR" dirty="0" err="1"/>
-              <a:t>comments</a:t>
-            </a:r>
-            <a:r>
-              <a:rPr lang="fr-FR" dirty="0"/>
-              <a:t>, etc…)</a:t>
-            </a:r>
+              <a:t> </a:t>
+            </a:r>
+            <a:r>
+              <a:rPr lang="fr-FR" dirty="0" smtClean="0"/>
+              <a:t>(/api/client/{id})</a:t>
+            </a:r>
+            <a:endParaRPr lang="fr-FR" dirty="0"/>
           </a:p>
           <a:p>
             <a:pPr>
@@ -14366,11 +14272,7 @@
             <a:pPr rtl="0"/>
             <a:r>
               <a:rPr lang="fr-FR" dirty="0" smtClean="0"/>
-              <a:t>Démonstration </a:t>
-            </a:r>
-            <a:r>
-              <a:rPr lang="fr-FR" dirty="0" smtClean="0"/>
-              <a:t>de l’API</a:t>
+              <a:t>Démonstration de l’API</a:t>
             </a:r>
             <a:endParaRPr lang="fr-FR" dirty="0"/>
           </a:p>
@@ -15574,20 +15476,20 @@
 </file>
 
 <file path=customXml/item2.xml><?xml version="1.0" encoding="utf-8"?>
-<p:properties xmlns:p="http://schemas.microsoft.com/office/2006/metadata/properties" xmlns:xsi="http://www.w3.org/2001/XMLSchema-instance" xmlns:pc="http://schemas.microsoft.com/office/infopath/2007/PartnerControls">
-  <documentManagement>
-    <MediaServiceKeyPoints xmlns="71af3243-3dd4-4a8d-8c0d-dd76da1f02a5" xsi:nil="true"/>
-  </documentManagement>
-</p:properties>
-</file>
-
-<file path=customXml/item3.xml><?xml version="1.0" encoding="utf-8"?>
 <?mso-contentType ?>
 <FormTemplates xmlns="http://schemas.microsoft.com/sharepoint/v3/contenttype/forms">
   <Display>DocumentLibraryForm</Display>
   <Edit>DocumentLibraryForm</Edit>
   <New>DocumentLibraryForm</New>
 </FormTemplates>
+</file>
+
+<file path=customXml/item3.xml><?xml version="1.0" encoding="utf-8"?>
+<p:properties xmlns:p="http://schemas.microsoft.com/office/2006/metadata/properties" xmlns:xsi="http://www.w3.org/2001/XMLSchema-instance" xmlns:pc="http://schemas.microsoft.com/office/infopath/2007/PartnerControls">
+  <documentManagement>
+    <MediaServiceKeyPoints xmlns="71af3243-3dd4-4a8d-8c0d-dd76da1f02a5" xsi:nil="true"/>
+  </documentManagement>
+</p:properties>
 </file>
 
 <file path=customXml/itemProps1.xml><?xml version="1.0" encoding="utf-8"?>
@@ -15610,6 +15512,14 @@
 </file>
 
 <file path=customXml/itemProps2.xml><?xml version="1.0" encoding="utf-8"?>
+<ds:datastoreItem xmlns:ds="http://schemas.openxmlformats.org/officeDocument/2006/customXml" ds:itemID="{507C3E52-A0B1-49C0-88BD-66B715EE8BB7}">
+  <ds:schemaRefs>
+    <ds:schemaRef ds:uri="http://schemas.microsoft.com/sharepoint/v3/contenttype/forms"/>
+  </ds:schemaRefs>
+</ds:datastoreItem>
+</file>
+
+<file path=customXml/itemProps3.xml><?xml version="1.0" encoding="utf-8"?>
 <ds:datastoreItem xmlns:ds="http://schemas.openxmlformats.org/officeDocument/2006/customXml" ds:itemID="{CCB8F5F2-61AB-4CE6-A5E3-F34B87B0EE42}">
   <ds:schemaRefs>
     <ds:schemaRef ds:uri="http://purl.org/dc/elements/1.1/"/>
@@ -15624,12 +15534,4 @@
     <ds:schemaRef ds:uri="http://purl.org/dc/dcmitype/"/>
   </ds:schemaRefs>
 </ds:datastoreItem>
-</file>
-
-<file path=customXml/itemProps3.xml><?xml version="1.0" encoding="utf-8"?>
-<ds:datastoreItem xmlns:ds="http://schemas.openxmlformats.org/officeDocument/2006/customXml" ds:itemID="{507C3E52-A0B1-49C0-88BD-66B715EE8BB7}">
-  <ds:schemaRefs>
-    <ds:schemaRef ds:uri="http://schemas.microsoft.com/sharepoint/v3/contenttype/forms"/>
-  </ds:schemaRefs>
-</ds:datastoreItem>
 </file>
</xml_diff>